<commit_message>
uploading chapter 6 lectures and exercises
</commit_message>
<xml_diff>
--- a/chapter_05/lecture_07.pptx
+++ b/chapter_05/lecture_07.pptx
@@ -223,7 +223,7 @@
           <a:p>
             <a:fld id="{4CD838CD-22F2-904D-A1A7-4CFC0C6A1258}" type="datetimeFigureOut">
               <a:rPr lang="en-US" smtClean="0"/>
-              <a:t>6/15/20</a:t>
+              <a:t>6/18/20</a:t>
             </a:fld>
             <a:endParaRPr lang="en-US"/>
           </a:p>
@@ -637,7 +637,7 @@
           <a:p>
             <a:fld id="{6E03C8A8-B9C8-1F47-AF19-42A2585DB06B}" type="datetimeFigureOut">
               <a:rPr lang="en-US" smtClean="0"/>
-              <a:t>6/15/20</a:t>
+              <a:t>6/18/20</a:t>
             </a:fld>
             <a:endParaRPr lang="en-US"/>
           </a:p>
@@ -835,7 +835,7 @@
           <a:p>
             <a:fld id="{6E03C8A8-B9C8-1F47-AF19-42A2585DB06B}" type="datetimeFigureOut">
               <a:rPr lang="en-US" smtClean="0"/>
-              <a:t>6/15/20</a:t>
+              <a:t>6/18/20</a:t>
             </a:fld>
             <a:endParaRPr lang="en-US"/>
           </a:p>
@@ -1043,7 +1043,7 @@
           <a:p>
             <a:fld id="{6E03C8A8-B9C8-1F47-AF19-42A2585DB06B}" type="datetimeFigureOut">
               <a:rPr lang="en-US" smtClean="0"/>
-              <a:t>6/15/20</a:t>
+              <a:t>6/18/20</a:t>
             </a:fld>
             <a:endParaRPr lang="en-US"/>
           </a:p>
@@ -1241,7 +1241,7 @@
           <a:p>
             <a:fld id="{6E03C8A8-B9C8-1F47-AF19-42A2585DB06B}" type="datetimeFigureOut">
               <a:rPr lang="en-US" smtClean="0"/>
-              <a:t>6/15/20</a:t>
+              <a:t>6/18/20</a:t>
             </a:fld>
             <a:endParaRPr lang="en-US"/>
           </a:p>
@@ -1516,7 +1516,7 @@
           <a:p>
             <a:fld id="{6E03C8A8-B9C8-1F47-AF19-42A2585DB06B}" type="datetimeFigureOut">
               <a:rPr lang="en-US" smtClean="0"/>
-              <a:t>6/15/20</a:t>
+              <a:t>6/18/20</a:t>
             </a:fld>
             <a:endParaRPr lang="en-US"/>
           </a:p>
@@ -1795,7 +1795,7 @@
           <a:p>
             <a:fld id="{6E03C8A8-B9C8-1F47-AF19-42A2585DB06B}" type="datetimeFigureOut">
               <a:rPr lang="en-US" smtClean="0"/>
-              <a:t>6/15/20</a:t>
+              <a:t>6/18/20</a:t>
             </a:fld>
             <a:endParaRPr lang="en-US"/>
           </a:p>
@@ -2269,7 +2269,7 @@
           <a:p>
             <a:fld id="{6E03C8A8-B9C8-1F47-AF19-42A2585DB06B}" type="datetimeFigureOut">
               <a:rPr lang="en-US" smtClean="0"/>
-              <a:t>6/15/20</a:t>
+              <a:t>6/18/20</a:t>
             </a:fld>
             <a:endParaRPr lang="en-US"/>
           </a:p>
@@ -2410,7 +2410,7 @@
           <a:p>
             <a:fld id="{6E03C8A8-B9C8-1F47-AF19-42A2585DB06B}" type="datetimeFigureOut">
               <a:rPr lang="en-US" smtClean="0"/>
-              <a:t>6/15/20</a:t>
+              <a:t>6/18/20</a:t>
             </a:fld>
             <a:endParaRPr lang="en-US"/>
           </a:p>
@@ -2523,7 +2523,7 @@
           <a:p>
             <a:fld id="{6E03C8A8-B9C8-1F47-AF19-42A2585DB06B}" type="datetimeFigureOut">
               <a:rPr lang="en-US" smtClean="0"/>
-              <a:t>6/15/20</a:t>
+              <a:t>6/18/20</a:t>
             </a:fld>
             <a:endParaRPr lang="en-US"/>
           </a:p>
@@ -2834,7 +2834,7 @@
           <a:p>
             <a:fld id="{6E03C8A8-B9C8-1F47-AF19-42A2585DB06B}" type="datetimeFigureOut">
               <a:rPr lang="en-US" smtClean="0"/>
-              <a:t>6/15/20</a:t>
+              <a:t>6/18/20</a:t>
             </a:fld>
             <a:endParaRPr lang="en-US"/>
           </a:p>
@@ -3122,7 +3122,7 @@
           <a:p>
             <a:fld id="{6E03C8A8-B9C8-1F47-AF19-42A2585DB06B}" type="datetimeFigureOut">
               <a:rPr lang="en-US" smtClean="0"/>
-              <a:t>6/15/20</a:t>
+              <a:t>6/18/20</a:t>
             </a:fld>
             <a:endParaRPr lang="en-US"/>
           </a:p>
@@ -3363,7 +3363,7 @@
           <a:p>
             <a:fld id="{6E03C8A8-B9C8-1F47-AF19-42A2585DB06B}" type="datetimeFigureOut">
               <a:rPr lang="en-US" smtClean="0"/>
-              <a:t>6/15/20</a:t>
+              <a:t>6/18/20</a:t>
             </a:fld>
             <a:endParaRPr lang="en-US"/>
           </a:p>
@@ -14190,9 +14190,10 @@
           <a:p>
             <a:pPr lvl="2"/>
             <a:r>
-              <a:rPr lang="en-US" dirty="0"/>
+              <a:rPr lang="en-US"/>
               <a:t>jumps</a:t>
             </a:r>
+            <a:endParaRPr lang="en-US" dirty="0"/>
           </a:p>
         </p:txBody>
       </p:sp>

</xml_diff>